<commit_message>
UserGuide.adoc: Updated all images
</commit_message>
<xml_diff>
--- a/docs/diagrams/Command_Record.pptx
+++ b/docs/diagrams/Command_Record.pptx
@@ -112,6 +112,11 @@
       </a:defRPr>
     </a:lvl9pPr>
   </p:defaultTextStyle>
+  <p:extLst>
+    <p:ext uri="{EFAFB233-063F-42B5-8137-9DF3F51BA10A}">
+      <p15:sldGuideLst xmlns:p15="http://schemas.microsoft.com/office/powerpoint/2012/main"/>
+    </p:ext>
+  </p:extLst>
 </p:presentation>
 </file>
 
@@ -197,7 +202,7 @@
           <a:p>
             <a:fld id="{8E5BA410-AEFC-4096-AA07-0FAC84D99832}" type="datetimeFigureOut">
               <a:rPr lang="en-SG" smtClean="0"/>
-              <a:t>30/10/2018</a:t>
+              <a:t>31/10/2018</a:t>
             </a:fld>
             <a:endParaRPr lang="en-SG"/>
           </a:p>
@@ -1136,7 +1141,7 @@
           <a:p>
             <a:fld id="{9EA1E237-0560-428C-B221-4A3423CA1D4D}" type="datetimeFigureOut">
               <a:rPr lang="en-SG" smtClean="0"/>
-              <a:t>30/10/2018</a:t>
+              <a:t>31/10/2018</a:t>
             </a:fld>
             <a:endParaRPr lang="en-SG"/>
           </a:p>
@@ -1336,7 +1341,7 @@
           <a:p>
             <a:fld id="{9EA1E237-0560-428C-B221-4A3423CA1D4D}" type="datetimeFigureOut">
               <a:rPr lang="en-SG" smtClean="0"/>
-              <a:t>30/10/2018</a:t>
+              <a:t>31/10/2018</a:t>
             </a:fld>
             <a:endParaRPr lang="en-SG"/>
           </a:p>
@@ -1546,7 +1551,7 @@
           <a:p>
             <a:fld id="{9EA1E237-0560-428C-B221-4A3423CA1D4D}" type="datetimeFigureOut">
               <a:rPr lang="en-SG" smtClean="0"/>
-              <a:t>30/10/2018</a:t>
+              <a:t>31/10/2018</a:t>
             </a:fld>
             <a:endParaRPr lang="en-SG"/>
           </a:p>
@@ -1746,7 +1751,7 @@
           <a:p>
             <a:fld id="{9EA1E237-0560-428C-B221-4A3423CA1D4D}" type="datetimeFigureOut">
               <a:rPr lang="en-SG" smtClean="0"/>
-              <a:t>30/10/2018</a:t>
+              <a:t>31/10/2018</a:t>
             </a:fld>
             <a:endParaRPr lang="en-SG"/>
           </a:p>
@@ -2022,7 +2027,7 @@
           <a:p>
             <a:fld id="{9EA1E237-0560-428C-B221-4A3423CA1D4D}" type="datetimeFigureOut">
               <a:rPr lang="en-SG" smtClean="0"/>
-              <a:t>30/10/2018</a:t>
+              <a:t>31/10/2018</a:t>
             </a:fld>
             <a:endParaRPr lang="en-SG"/>
           </a:p>
@@ -2290,7 +2295,7 @@
           <a:p>
             <a:fld id="{9EA1E237-0560-428C-B221-4A3423CA1D4D}" type="datetimeFigureOut">
               <a:rPr lang="en-SG" smtClean="0"/>
-              <a:t>30/10/2018</a:t>
+              <a:t>31/10/2018</a:t>
             </a:fld>
             <a:endParaRPr lang="en-SG"/>
           </a:p>
@@ -2705,7 +2710,7 @@
           <a:p>
             <a:fld id="{9EA1E237-0560-428C-B221-4A3423CA1D4D}" type="datetimeFigureOut">
               <a:rPr lang="en-SG" smtClean="0"/>
-              <a:t>30/10/2018</a:t>
+              <a:t>31/10/2018</a:t>
             </a:fld>
             <a:endParaRPr lang="en-SG"/>
           </a:p>
@@ -2847,7 +2852,7 @@
           <a:p>
             <a:fld id="{9EA1E237-0560-428C-B221-4A3423CA1D4D}" type="datetimeFigureOut">
               <a:rPr lang="en-SG" smtClean="0"/>
-              <a:t>30/10/2018</a:t>
+              <a:t>31/10/2018</a:t>
             </a:fld>
             <a:endParaRPr lang="en-SG"/>
           </a:p>
@@ -2960,7 +2965,7 @@
           <a:p>
             <a:fld id="{9EA1E237-0560-428C-B221-4A3423CA1D4D}" type="datetimeFigureOut">
               <a:rPr lang="en-SG" smtClean="0"/>
-              <a:t>30/10/2018</a:t>
+              <a:t>31/10/2018</a:t>
             </a:fld>
             <a:endParaRPr lang="en-SG"/>
           </a:p>
@@ -3273,7 +3278,7 @@
           <a:p>
             <a:fld id="{9EA1E237-0560-428C-B221-4A3423CA1D4D}" type="datetimeFigureOut">
               <a:rPr lang="en-SG" smtClean="0"/>
-              <a:t>30/10/2018</a:t>
+              <a:t>31/10/2018</a:t>
             </a:fld>
             <a:endParaRPr lang="en-SG"/>
           </a:p>
@@ -3562,7 +3567,7 @@
           <a:p>
             <a:fld id="{9EA1E237-0560-428C-B221-4A3423CA1D4D}" type="datetimeFigureOut">
               <a:rPr lang="en-SG" smtClean="0"/>
-              <a:t>30/10/2018</a:t>
+              <a:t>31/10/2018</a:t>
             </a:fld>
             <a:endParaRPr lang="en-SG"/>
           </a:p>
@@ -3805,7 +3810,7 @@
           <a:p>
             <a:fld id="{9EA1E237-0560-428C-B221-4A3423CA1D4D}" type="datetimeFigureOut">
               <a:rPr lang="en-SG" smtClean="0"/>
-              <a:t>30/10/2018</a:t>
+              <a:t>31/10/2018</a:t>
             </a:fld>
             <a:endParaRPr lang="en-SG"/>
           </a:p>
@@ -4224,10 +4229,10 @@
       </p:grpSpPr>
       <p:pic>
         <p:nvPicPr>
-          <p:cNvPr id="5" name="Picture 4">
-            <a:extLst>
-              <a:ext uri="{FF2B5EF4-FFF2-40B4-BE49-F238E27FC236}">
-                <a16:creationId xmlns:a16="http://schemas.microsoft.com/office/drawing/2014/main" id="{546A211B-21ED-4FB3-BBD8-89B8A3227ECA}"/>
+          <p:cNvPr id="3" name="Picture 2">
+            <a:extLst>
+              <a:ext uri="{FF2B5EF4-FFF2-40B4-BE49-F238E27FC236}">
+                <a16:creationId xmlns:a16="http://schemas.microsoft.com/office/drawing/2014/main" id="{BD280C0F-6DAE-4A36-97A8-CC802B0B9C52}"/>
               </a:ext>
             </a:extLst>
           </p:cNvPr>
@@ -4250,10 +4255,6 @@
           <a:prstGeom prst="rect">
             <a:avLst/>
           </a:prstGeom>
-          <a:noFill/>
-          <a:ln>
-            <a:noFill/>
-          </a:ln>
         </p:spPr>
       </p:pic>
       <p:sp>
@@ -4785,10 +4786,10 @@
       </p:grpSpPr>
       <p:pic>
         <p:nvPicPr>
-          <p:cNvPr id="4" name="Picture 3">
-            <a:extLst>
-              <a:ext uri="{FF2B5EF4-FFF2-40B4-BE49-F238E27FC236}">
-                <a16:creationId xmlns:a16="http://schemas.microsoft.com/office/drawing/2014/main" id="{F7F4EE8A-82BE-49A5-8A89-0E2EF849447A}"/>
+          <p:cNvPr id="2" name="Picture 1">
+            <a:extLst>
+              <a:ext uri="{FF2B5EF4-FFF2-40B4-BE49-F238E27FC236}">
+                <a16:creationId xmlns:a16="http://schemas.microsoft.com/office/drawing/2014/main" id="{B9DF11C2-CAAA-498D-8DE2-068A9123B911}"/>
               </a:ext>
             </a:extLst>
           </p:cNvPr>
@@ -4805,8 +4806,8 @@
         </p:blipFill>
         <p:spPr>
           <a:xfrm>
-            <a:off x="4136571" y="0"/>
-            <a:ext cx="3918857" cy="6858000"/>
+            <a:off x="4149090" y="0"/>
+            <a:ext cx="3893820" cy="6858000"/>
           </a:xfrm>
           <a:prstGeom prst="rect">
             <a:avLst/>
@@ -4879,7 +4880,7 @@
         </p:nvSpPr>
         <p:spPr>
           <a:xfrm>
-            <a:off x="4333875" y="2886075"/>
+            <a:off x="4333875" y="2332621"/>
             <a:ext cx="342900" cy="323850"/>
           </a:xfrm>
           <a:prstGeom prst="ellipse">
@@ -4931,7 +4932,59 @@
         </p:nvSpPr>
         <p:spPr>
           <a:xfrm>
-            <a:off x="4333875" y="4943475"/>
+            <a:off x="4333875" y="3812506"/>
+            <a:ext cx="342900" cy="323850"/>
+          </a:xfrm>
+          <a:prstGeom prst="ellipse">
+            <a:avLst/>
+          </a:prstGeom>
+          <a:noFill/>
+          <a:ln w="38100">
+            <a:solidFill>
+              <a:srgbClr val="FF0000"/>
+            </a:solidFill>
+          </a:ln>
+        </p:spPr>
+        <p:style>
+          <a:lnRef idx="2">
+            <a:schemeClr val="accent1">
+              <a:shade val="50000"/>
+            </a:schemeClr>
+          </a:lnRef>
+          <a:fillRef idx="1">
+            <a:schemeClr val="accent1"/>
+          </a:fillRef>
+          <a:effectRef idx="0">
+            <a:schemeClr val="accent1"/>
+          </a:effectRef>
+          <a:fontRef idx="minor">
+            <a:schemeClr val="lt1"/>
+          </a:fontRef>
+        </p:style>
+        <p:txBody>
+          <a:bodyPr rtlCol="0" anchor="ctr"/>
+          <a:lstStyle/>
+          <a:p>
+            <a:pPr algn="ctr"/>
+            <a:endParaRPr lang="en-SG"/>
+          </a:p>
+        </p:txBody>
+      </p:sp>
+      <p:sp>
+        <p:nvSpPr>
+          <p:cNvPr id="8" name="Oval 7">
+            <a:extLst>
+              <a:ext uri="{FF2B5EF4-FFF2-40B4-BE49-F238E27FC236}">
+                <a16:creationId xmlns:a16="http://schemas.microsoft.com/office/drawing/2014/main" id="{FB3E587E-EC16-4A60-ACCA-7B919994E259}"/>
+              </a:ext>
+            </a:extLst>
+          </p:cNvPr>
+          <p:cNvSpPr/>
+          <p:nvPr/>
+        </p:nvSpPr>
+        <p:spPr>
+          <a:xfrm>
+            <a:off x="4365959" y="5312445"/>
             <a:ext cx="342900" cy="323850"/>
           </a:xfrm>
           <a:prstGeom prst="ellipse">

</xml_diff>

<commit_message>
UserGuide.adoc: Switch and manage command
</commit_message>
<xml_diff>
--- a/docs/diagrams/Command_Record.pptx
+++ b/docs/diagrams/Command_Record.pptx
@@ -5,15 +5,16 @@
     <p:sldMasterId id="2147483648" r:id="rId1"/>
   </p:sldMasterIdLst>
   <p:notesMasterIdLst>
-    <p:notesMasterId r:id="rId8"/>
+    <p:notesMasterId r:id="rId9"/>
   </p:notesMasterIdLst>
   <p:sldIdLst>
     <p:sldId id="257" r:id="rId2"/>
     <p:sldId id="258" r:id="rId3"/>
-    <p:sldId id="256" r:id="rId4"/>
-    <p:sldId id="261" r:id="rId5"/>
-    <p:sldId id="259" r:id="rId6"/>
-    <p:sldId id="260" r:id="rId7"/>
+    <p:sldId id="262" r:id="rId4"/>
+    <p:sldId id="256" r:id="rId5"/>
+    <p:sldId id="261" r:id="rId6"/>
+    <p:sldId id="259" r:id="rId7"/>
+    <p:sldId id="260" r:id="rId8"/>
   </p:sldIdLst>
   <p:sldSz cx="12192000" cy="6858000"/>
   <p:notesSz cx="6858000" cy="9144000"/>
@@ -202,7 +203,7 @@
           <a:p>
             <a:fld id="{8E5BA410-AEFC-4096-AA07-0FAC84D99832}" type="datetimeFigureOut">
               <a:rPr lang="en-SG" smtClean="0"/>
-              <a:t>31/10/2018</a:t>
+              <a:t>2/11/2018</a:t>
             </a:fld>
             <a:endParaRPr lang="en-SG"/>
           </a:p>
@@ -603,8 +604,13 @@
           <a:p>
             <a:r>
               <a:rPr lang="en-SG" dirty="0"/>
-              <a:t>Add record- event index</a:t>
-            </a:r>
+              <a:t>Event </a:t>
+            </a:r>
+            <a:r>
+              <a:rPr lang="en-SG"/>
+              <a:t>at index 1</a:t>
+            </a:r>
+            <a:endParaRPr lang="en-SG" dirty="0"/>
           </a:p>
         </p:txBody>
       </p:sp>
@@ -690,7 +696,7 @@
           <a:p>
             <a:r>
               <a:rPr lang="en-SG" dirty="0"/>
-              <a:t>Add record- volunteer index</a:t>
+              <a:t>Add record- event index</a:t>
             </a:r>
           </a:p>
         </p:txBody>
@@ -721,7 +727,7 @@
     </p:spTree>
     <p:extLst>
       <p:ext uri="{BB962C8B-B14F-4D97-AF65-F5344CB8AC3E}">
-        <p14:creationId xmlns:p14="http://schemas.microsoft.com/office/powerpoint/2010/main" val="2893158535"/>
+        <p14:creationId xmlns:p14="http://schemas.microsoft.com/office/powerpoint/2010/main" val="3652761009"/>
       </p:ext>
     </p:extLst>
   </p:cSld>
@@ -777,7 +783,7 @@
           <a:p>
             <a:r>
               <a:rPr lang="en-SG" dirty="0"/>
-              <a:t>Edit record- volunteer index</a:t>
+              <a:t>Add record- volunteer index</a:t>
             </a:r>
           </a:p>
         </p:txBody>
@@ -808,7 +814,7 @@
     </p:spTree>
     <p:extLst>
       <p:ext uri="{BB962C8B-B14F-4D97-AF65-F5344CB8AC3E}">
-        <p14:creationId xmlns:p14="http://schemas.microsoft.com/office/powerpoint/2010/main" val="918047464"/>
+        <p14:creationId xmlns:p14="http://schemas.microsoft.com/office/powerpoint/2010/main" val="2893158535"/>
       </p:ext>
     </p:extLst>
   </p:cSld>
@@ -864,7 +870,7 @@
           <a:p>
             <a:r>
               <a:rPr lang="en-SG" dirty="0"/>
-              <a:t>Edit record- before</a:t>
+              <a:t>Edit record- volunteer index</a:t>
             </a:r>
           </a:p>
         </p:txBody>
@@ -895,7 +901,7 @@
     </p:spTree>
     <p:extLst>
       <p:ext uri="{BB962C8B-B14F-4D97-AF65-F5344CB8AC3E}">
-        <p14:creationId xmlns:p14="http://schemas.microsoft.com/office/powerpoint/2010/main" val="2929310617"/>
+        <p14:creationId xmlns:p14="http://schemas.microsoft.com/office/powerpoint/2010/main" val="918047464"/>
       </p:ext>
     </p:extLst>
   </p:cSld>
@@ -951,7 +957,7 @@
           <a:p>
             <a:r>
               <a:rPr lang="en-SG" dirty="0"/>
-              <a:t>Edit record- after</a:t>
+              <a:t>Edit record- before</a:t>
             </a:r>
           </a:p>
         </p:txBody>
@@ -974,6 +980,93 @@
             <a:fld id="{FC0F98C0-056B-48FE-8CB9-52F1DBAED55E}" type="slidenum">
               <a:rPr lang="en-SG" smtClean="0"/>
               <a:t>6</a:t>
+            </a:fld>
+            <a:endParaRPr lang="en-SG"/>
+          </a:p>
+        </p:txBody>
+      </p:sp>
+    </p:spTree>
+    <p:extLst>
+      <p:ext uri="{BB962C8B-B14F-4D97-AF65-F5344CB8AC3E}">
+        <p14:creationId xmlns:p14="http://schemas.microsoft.com/office/powerpoint/2010/main" val="2929310617"/>
+      </p:ext>
+    </p:extLst>
+  </p:cSld>
+  <p:clrMapOvr>
+    <a:masterClrMapping/>
+  </p:clrMapOvr>
+</p:notes>
+</file>
+
+<file path=ppt/notesSlides/notesSlide7.xml><?xml version="1.0" encoding="utf-8"?>
+<p:notes xmlns:a="http://schemas.openxmlformats.org/drawingml/2006/main" xmlns:r="http://schemas.openxmlformats.org/officeDocument/2006/relationships" xmlns:p="http://schemas.openxmlformats.org/presentationml/2006/main">
+  <p:cSld>
+    <p:spTree>
+      <p:nvGrpSpPr>
+        <p:cNvPr id="1" name=""/>
+        <p:cNvGrpSpPr/>
+        <p:nvPr/>
+      </p:nvGrpSpPr>
+      <p:grpSpPr>
+        <a:xfrm>
+          <a:off x="0" y="0"/>
+          <a:ext cx="0" cy="0"/>
+          <a:chOff x="0" y="0"/>
+          <a:chExt cx="0" cy="0"/>
+        </a:xfrm>
+      </p:grpSpPr>
+      <p:sp>
+        <p:nvSpPr>
+          <p:cNvPr id="2" name="Slide Image Placeholder 1"/>
+          <p:cNvSpPr>
+            <a:spLocks noGrp="1" noRot="1" noChangeAspect="1"/>
+          </p:cNvSpPr>
+          <p:nvPr>
+            <p:ph type="sldImg"/>
+          </p:nvPr>
+        </p:nvSpPr>
+        <p:spPr/>
+      </p:sp>
+      <p:sp>
+        <p:nvSpPr>
+          <p:cNvPr id="3" name="Notes Placeholder 2"/>
+          <p:cNvSpPr>
+            <a:spLocks noGrp="1"/>
+          </p:cNvSpPr>
+          <p:nvPr>
+            <p:ph type="body" idx="1"/>
+          </p:nvPr>
+        </p:nvSpPr>
+        <p:spPr/>
+        <p:txBody>
+          <a:bodyPr/>
+          <a:lstStyle/>
+          <a:p>
+            <a:r>
+              <a:rPr lang="en-SG" dirty="0"/>
+              <a:t>Edit record- after</a:t>
+            </a:r>
+          </a:p>
+        </p:txBody>
+      </p:sp>
+      <p:sp>
+        <p:nvSpPr>
+          <p:cNvPr id="4" name="Slide Number Placeholder 3"/>
+          <p:cNvSpPr>
+            <a:spLocks noGrp="1"/>
+          </p:cNvSpPr>
+          <p:nvPr>
+            <p:ph type="sldNum" sz="quarter" idx="5"/>
+          </p:nvPr>
+        </p:nvSpPr>
+        <p:spPr/>
+        <p:txBody>
+          <a:bodyPr/>
+          <a:lstStyle/>
+          <a:p>
+            <a:fld id="{FC0F98C0-056B-48FE-8CB9-52F1DBAED55E}" type="slidenum">
+              <a:rPr lang="en-SG" smtClean="0"/>
+              <a:t>7</a:t>
             </a:fld>
             <a:endParaRPr lang="en-SG"/>
           </a:p>
@@ -1141,7 +1234,7 @@
           <a:p>
             <a:fld id="{9EA1E237-0560-428C-B221-4A3423CA1D4D}" type="datetimeFigureOut">
               <a:rPr lang="en-SG" smtClean="0"/>
-              <a:t>31/10/2018</a:t>
+              <a:t>2/11/2018</a:t>
             </a:fld>
             <a:endParaRPr lang="en-SG"/>
           </a:p>
@@ -1341,7 +1434,7 @@
           <a:p>
             <a:fld id="{9EA1E237-0560-428C-B221-4A3423CA1D4D}" type="datetimeFigureOut">
               <a:rPr lang="en-SG" smtClean="0"/>
-              <a:t>31/10/2018</a:t>
+              <a:t>2/11/2018</a:t>
             </a:fld>
             <a:endParaRPr lang="en-SG"/>
           </a:p>
@@ -1551,7 +1644,7 @@
           <a:p>
             <a:fld id="{9EA1E237-0560-428C-B221-4A3423CA1D4D}" type="datetimeFigureOut">
               <a:rPr lang="en-SG" smtClean="0"/>
-              <a:t>31/10/2018</a:t>
+              <a:t>2/11/2018</a:t>
             </a:fld>
             <a:endParaRPr lang="en-SG"/>
           </a:p>
@@ -1751,7 +1844,7 @@
           <a:p>
             <a:fld id="{9EA1E237-0560-428C-B221-4A3423CA1D4D}" type="datetimeFigureOut">
               <a:rPr lang="en-SG" smtClean="0"/>
-              <a:t>31/10/2018</a:t>
+              <a:t>2/11/2018</a:t>
             </a:fld>
             <a:endParaRPr lang="en-SG"/>
           </a:p>
@@ -2027,7 +2120,7 @@
           <a:p>
             <a:fld id="{9EA1E237-0560-428C-B221-4A3423CA1D4D}" type="datetimeFigureOut">
               <a:rPr lang="en-SG" smtClean="0"/>
-              <a:t>31/10/2018</a:t>
+              <a:t>2/11/2018</a:t>
             </a:fld>
             <a:endParaRPr lang="en-SG"/>
           </a:p>
@@ -2295,7 +2388,7 @@
           <a:p>
             <a:fld id="{9EA1E237-0560-428C-B221-4A3423CA1D4D}" type="datetimeFigureOut">
               <a:rPr lang="en-SG" smtClean="0"/>
-              <a:t>31/10/2018</a:t>
+              <a:t>2/11/2018</a:t>
             </a:fld>
             <a:endParaRPr lang="en-SG"/>
           </a:p>
@@ -2710,7 +2803,7 @@
           <a:p>
             <a:fld id="{9EA1E237-0560-428C-B221-4A3423CA1D4D}" type="datetimeFigureOut">
               <a:rPr lang="en-SG" smtClean="0"/>
-              <a:t>31/10/2018</a:t>
+              <a:t>2/11/2018</a:t>
             </a:fld>
             <a:endParaRPr lang="en-SG"/>
           </a:p>
@@ -2852,7 +2945,7 @@
           <a:p>
             <a:fld id="{9EA1E237-0560-428C-B221-4A3423CA1D4D}" type="datetimeFigureOut">
               <a:rPr lang="en-SG" smtClean="0"/>
-              <a:t>31/10/2018</a:t>
+              <a:t>2/11/2018</a:t>
             </a:fld>
             <a:endParaRPr lang="en-SG"/>
           </a:p>
@@ -2965,7 +3058,7 @@
           <a:p>
             <a:fld id="{9EA1E237-0560-428C-B221-4A3423CA1D4D}" type="datetimeFigureOut">
               <a:rPr lang="en-SG" smtClean="0"/>
-              <a:t>31/10/2018</a:t>
+              <a:t>2/11/2018</a:t>
             </a:fld>
             <a:endParaRPr lang="en-SG"/>
           </a:p>
@@ -3278,7 +3371,7 @@
           <a:p>
             <a:fld id="{9EA1E237-0560-428C-B221-4A3423CA1D4D}" type="datetimeFigureOut">
               <a:rPr lang="en-SG" smtClean="0"/>
-              <a:t>31/10/2018</a:t>
+              <a:t>2/11/2018</a:t>
             </a:fld>
             <a:endParaRPr lang="en-SG"/>
           </a:p>
@@ -3567,7 +3660,7 @@
           <a:p>
             <a:fld id="{9EA1E237-0560-428C-B221-4A3423CA1D4D}" type="datetimeFigureOut">
               <a:rPr lang="en-SG" smtClean="0"/>
-              <a:t>31/10/2018</a:t>
+              <a:t>2/11/2018</a:t>
             </a:fld>
             <a:endParaRPr lang="en-SG"/>
           </a:p>
@@ -3810,7 +3903,7 @@
           <a:p>
             <a:fld id="{9EA1E237-0560-428C-B221-4A3423CA1D4D}" type="datetimeFigureOut">
               <a:rPr lang="en-SG" smtClean="0"/>
-              <a:t>31/10/2018</a:t>
+              <a:t>2/11/2018</a:t>
             </a:fld>
             <a:endParaRPr lang="en-SG"/>
           </a:p>
@@ -4652,10 +4745,10 @@
       </p:pic>
       <p:sp>
         <p:nvSpPr>
-          <p:cNvPr id="6" name="Oval 5">
-            <a:extLst>
-              <a:ext uri="{FF2B5EF4-FFF2-40B4-BE49-F238E27FC236}">
-                <a16:creationId xmlns:a16="http://schemas.microsoft.com/office/drawing/2014/main" id="{9857E78E-D905-4B5F-AB5F-F5F0A4BA5AFE}"/>
+          <p:cNvPr id="2" name="Rectangle 1">
+            <a:extLst>
+              <a:ext uri="{FF2B5EF4-FFF2-40B4-BE49-F238E27FC236}">
+                <a16:creationId xmlns:a16="http://schemas.microsoft.com/office/drawing/2014/main" id="{3185B7D8-54D7-4EDB-B3AB-F90FFE771101}"/>
               </a:ext>
             </a:extLst>
           </p:cNvPr>
@@ -4664,62 +4757,10 @@
         </p:nvSpPr>
         <p:spPr>
           <a:xfrm>
-            <a:off x="4629151" y="1228725"/>
-            <a:ext cx="304800" cy="332509"/>
+            <a:off x="4463966" y="1118937"/>
+            <a:ext cx="3264068" cy="1359568"/>
           </a:xfrm>
-          <a:prstGeom prst="ellipse">
-            <a:avLst/>
-          </a:prstGeom>
-          <a:noFill/>
-          <a:ln w="38100">
-            <a:solidFill>
-              <a:srgbClr val="FF0000"/>
-            </a:solidFill>
-          </a:ln>
-        </p:spPr>
-        <p:style>
-          <a:lnRef idx="2">
-            <a:schemeClr val="accent1">
-              <a:shade val="50000"/>
-            </a:schemeClr>
-          </a:lnRef>
-          <a:fillRef idx="1">
-            <a:schemeClr val="accent1"/>
-          </a:fillRef>
-          <a:effectRef idx="0">
-            <a:schemeClr val="accent1"/>
-          </a:effectRef>
-          <a:fontRef idx="minor">
-            <a:schemeClr val="lt1"/>
-          </a:fontRef>
-        </p:style>
-        <p:txBody>
-          <a:bodyPr rtlCol="0" anchor="ctr"/>
-          <a:lstStyle/>
-          <a:p>
-            <a:pPr algn="ctr"/>
-            <a:endParaRPr lang="en-SG"/>
-          </a:p>
-        </p:txBody>
-      </p:sp>
-      <p:sp>
-        <p:nvSpPr>
-          <p:cNvPr id="7" name="Oval 6">
-            <a:extLst>
-              <a:ext uri="{FF2B5EF4-FFF2-40B4-BE49-F238E27FC236}">
-                <a16:creationId xmlns:a16="http://schemas.microsoft.com/office/drawing/2014/main" id="{E0751A43-FA0D-4158-8921-416D90EABD93}"/>
-              </a:ext>
-            </a:extLst>
-          </p:cNvPr>
-          <p:cNvSpPr/>
-          <p:nvPr/>
-        </p:nvSpPr>
-        <p:spPr>
-          <a:xfrm>
-            <a:off x="4619626" y="2562225"/>
-            <a:ext cx="304800" cy="332509"/>
-          </a:xfrm>
-          <a:prstGeom prst="ellipse">
+          <a:prstGeom prst="rect">
             <a:avLst/>
           </a:prstGeom>
           <a:noFill/>
@@ -4786,6 +4827,176 @@
       </p:grpSpPr>
       <p:pic>
         <p:nvPicPr>
+          <p:cNvPr id="5" name="Picture 4">
+            <a:extLst>
+              <a:ext uri="{FF2B5EF4-FFF2-40B4-BE49-F238E27FC236}">
+                <a16:creationId xmlns:a16="http://schemas.microsoft.com/office/drawing/2014/main" id="{CB1924E4-30B7-4FD5-B6E2-33FD5ACD398D}"/>
+              </a:ext>
+            </a:extLst>
+          </p:cNvPr>
+          <p:cNvPicPr>
+            <a:picLocks noChangeAspect="1"/>
+          </p:cNvPicPr>
+          <p:nvPr/>
+        </p:nvPicPr>
+        <p:blipFill>
+          <a:blip r:embed="rId3">
+            <a:extLst>
+              <a:ext uri="{28A0092B-C50C-407E-A947-70E740481C1C}">
+                <a14:useLocalDpi xmlns:a14="http://schemas.microsoft.com/office/drawing/2010/main" val="0"/>
+              </a:ext>
+            </a:extLst>
+          </a:blip>
+          <a:stretch>
+            <a:fillRect/>
+          </a:stretch>
+        </p:blipFill>
+        <p:spPr>
+          <a:xfrm>
+            <a:off x="4463966" y="561827"/>
+            <a:ext cx="3264068" cy="5734345"/>
+          </a:xfrm>
+          <a:prstGeom prst="rect">
+            <a:avLst/>
+          </a:prstGeom>
+        </p:spPr>
+      </p:pic>
+      <p:sp>
+        <p:nvSpPr>
+          <p:cNvPr id="6" name="Oval 5">
+            <a:extLst>
+              <a:ext uri="{FF2B5EF4-FFF2-40B4-BE49-F238E27FC236}">
+                <a16:creationId xmlns:a16="http://schemas.microsoft.com/office/drawing/2014/main" id="{9857E78E-D905-4B5F-AB5F-F5F0A4BA5AFE}"/>
+              </a:ext>
+            </a:extLst>
+          </p:cNvPr>
+          <p:cNvSpPr/>
+          <p:nvPr/>
+        </p:nvSpPr>
+        <p:spPr>
+          <a:xfrm>
+            <a:off x="4629151" y="1228725"/>
+            <a:ext cx="304800" cy="332509"/>
+          </a:xfrm>
+          <a:prstGeom prst="ellipse">
+            <a:avLst/>
+          </a:prstGeom>
+          <a:noFill/>
+          <a:ln w="38100">
+            <a:solidFill>
+              <a:srgbClr val="FF0000"/>
+            </a:solidFill>
+          </a:ln>
+        </p:spPr>
+        <p:style>
+          <a:lnRef idx="2">
+            <a:schemeClr val="accent1">
+              <a:shade val="50000"/>
+            </a:schemeClr>
+          </a:lnRef>
+          <a:fillRef idx="1">
+            <a:schemeClr val="accent1"/>
+          </a:fillRef>
+          <a:effectRef idx="0">
+            <a:schemeClr val="accent1"/>
+          </a:effectRef>
+          <a:fontRef idx="minor">
+            <a:schemeClr val="lt1"/>
+          </a:fontRef>
+        </p:style>
+        <p:txBody>
+          <a:bodyPr rtlCol="0" anchor="ctr"/>
+          <a:lstStyle/>
+          <a:p>
+            <a:pPr algn="ctr"/>
+            <a:endParaRPr lang="en-SG"/>
+          </a:p>
+        </p:txBody>
+      </p:sp>
+      <p:sp>
+        <p:nvSpPr>
+          <p:cNvPr id="7" name="Oval 6">
+            <a:extLst>
+              <a:ext uri="{FF2B5EF4-FFF2-40B4-BE49-F238E27FC236}">
+                <a16:creationId xmlns:a16="http://schemas.microsoft.com/office/drawing/2014/main" id="{E0751A43-FA0D-4158-8921-416D90EABD93}"/>
+              </a:ext>
+            </a:extLst>
+          </p:cNvPr>
+          <p:cNvSpPr/>
+          <p:nvPr/>
+        </p:nvSpPr>
+        <p:spPr>
+          <a:xfrm>
+            <a:off x="4619626" y="2562225"/>
+            <a:ext cx="304800" cy="332509"/>
+          </a:xfrm>
+          <a:prstGeom prst="ellipse">
+            <a:avLst/>
+          </a:prstGeom>
+          <a:noFill/>
+          <a:ln w="38100">
+            <a:solidFill>
+              <a:srgbClr val="FF0000"/>
+            </a:solidFill>
+          </a:ln>
+        </p:spPr>
+        <p:style>
+          <a:lnRef idx="2">
+            <a:schemeClr val="accent1">
+              <a:shade val="50000"/>
+            </a:schemeClr>
+          </a:lnRef>
+          <a:fillRef idx="1">
+            <a:schemeClr val="accent1"/>
+          </a:fillRef>
+          <a:effectRef idx="0">
+            <a:schemeClr val="accent1"/>
+          </a:effectRef>
+          <a:fontRef idx="minor">
+            <a:schemeClr val="lt1"/>
+          </a:fontRef>
+        </p:style>
+        <p:txBody>
+          <a:bodyPr rtlCol="0" anchor="ctr"/>
+          <a:lstStyle/>
+          <a:p>
+            <a:pPr algn="ctr"/>
+            <a:endParaRPr lang="en-SG"/>
+          </a:p>
+        </p:txBody>
+      </p:sp>
+    </p:spTree>
+    <p:extLst>
+      <p:ext uri="{BB962C8B-B14F-4D97-AF65-F5344CB8AC3E}">
+        <p14:creationId xmlns:p14="http://schemas.microsoft.com/office/powerpoint/2010/main" val="1527211313"/>
+      </p:ext>
+    </p:extLst>
+  </p:cSld>
+  <p:clrMapOvr>
+    <a:masterClrMapping/>
+  </p:clrMapOvr>
+</p:sld>
+</file>
+
+<file path=ppt/slides/slide4.xml><?xml version="1.0" encoding="utf-8"?>
+<p:sld xmlns:a="http://schemas.openxmlformats.org/drawingml/2006/main" xmlns:r="http://schemas.openxmlformats.org/officeDocument/2006/relationships" xmlns:p="http://schemas.openxmlformats.org/presentationml/2006/main">
+  <p:cSld>
+    <p:spTree>
+      <p:nvGrpSpPr>
+        <p:cNvPr id="1" name=""/>
+        <p:cNvGrpSpPr/>
+        <p:nvPr/>
+      </p:nvGrpSpPr>
+      <p:grpSpPr>
+        <a:xfrm>
+          <a:off x="0" y="0"/>
+          <a:ext cx="0" cy="0"/>
+          <a:chOff x="0" y="0"/>
+          <a:chExt cx="0" cy="0"/>
+        </a:xfrm>
+      </p:grpSpPr>
+      <p:pic>
+        <p:nvPicPr>
           <p:cNvPr id="2" name="Picture 1">
             <a:extLst>
               <a:ext uri="{FF2B5EF4-FFF2-40B4-BE49-F238E27FC236}">
@@ -5035,7 +5246,7 @@
 </p:sld>
 </file>
 
-<file path=ppt/slides/slide4.xml><?xml version="1.0" encoding="utf-8"?>
+<file path=ppt/slides/slide5.xml><?xml version="1.0" encoding="utf-8"?>
 <p:sld xmlns:a="http://schemas.openxmlformats.org/drawingml/2006/main" xmlns:r="http://schemas.openxmlformats.org/officeDocument/2006/relationships" xmlns:p="http://schemas.openxmlformats.org/presentationml/2006/main">
   <p:cSld>
     <p:spTree>
@@ -5151,7 +5362,7 @@
 </p:sld>
 </file>
 
-<file path=ppt/slides/slide5.xml><?xml version="1.0" encoding="utf-8"?>
+<file path=ppt/slides/slide6.xml><?xml version="1.0" encoding="utf-8"?>
 <p:sld xmlns:a="http://schemas.openxmlformats.org/drawingml/2006/main" xmlns:r="http://schemas.openxmlformats.org/officeDocument/2006/relationships" xmlns:p="http://schemas.openxmlformats.org/presentationml/2006/main">
   <p:cSld>
     <p:spTree>
@@ -5269,7 +5480,7 @@
 </p:sld>
 </file>
 
-<file path=ppt/slides/slide6.xml><?xml version="1.0" encoding="utf-8"?>
+<file path=ppt/slides/slide7.xml><?xml version="1.0" encoding="utf-8"?>
 <p:sld xmlns:a="http://schemas.openxmlformats.org/drawingml/2006/main" xmlns:r="http://schemas.openxmlformats.org/officeDocument/2006/relationships" xmlns:p="http://schemas.openxmlformats.org/presentationml/2006/main">
   <p:cSld>
     <p:spTree>

</xml_diff>

<commit_message>
UserGuide.adoc: Overview and touchup
</commit_message>
<xml_diff>
--- a/docs/diagrams/Command_Record.pptx
+++ b/docs/diagrams/Command_Record.pptx
@@ -203,7 +203,7 @@
           <a:p>
             <a:fld id="{8E5BA410-AEFC-4096-AA07-0FAC84D99832}" type="datetimeFigureOut">
               <a:rPr lang="en-SG" smtClean="0"/>
-              <a:t>2/11/2018</a:t>
+              <a:t>10/11/2018</a:t>
             </a:fld>
             <a:endParaRPr lang="en-SG"/>
           </a:p>
@@ -1234,7 +1234,7 @@
           <a:p>
             <a:fld id="{9EA1E237-0560-428C-B221-4A3423CA1D4D}" type="datetimeFigureOut">
               <a:rPr lang="en-SG" smtClean="0"/>
-              <a:t>2/11/2018</a:t>
+              <a:t>10/11/2018</a:t>
             </a:fld>
             <a:endParaRPr lang="en-SG"/>
           </a:p>
@@ -1434,7 +1434,7 @@
           <a:p>
             <a:fld id="{9EA1E237-0560-428C-B221-4A3423CA1D4D}" type="datetimeFigureOut">
               <a:rPr lang="en-SG" smtClean="0"/>
-              <a:t>2/11/2018</a:t>
+              <a:t>10/11/2018</a:t>
             </a:fld>
             <a:endParaRPr lang="en-SG"/>
           </a:p>
@@ -1644,7 +1644,7 @@
           <a:p>
             <a:fld id="{9EA1E237-0560-428C-B221-4A3423CA1D4D}" type="datetimeFigureOut">
               <a:rPr lang="en-SG" smtClean="0"/>
-              <a:t>2/11/2018</a:t>
+              <a:t>10/11/2018</a:t>
             </a:fld>
             <a:endParaRPr lang="en-SG"/>
           </a:p>
@@ -1844,7 +1844,7 @@
           <a:p>
             <a:fld id="{9EA1E237-0560-428C-B221-4A3423CA1D4D}" type="datetimeFigureOut">
               <a:rPr lang="en-SG" smtClean="0"/>
-              <a:t>2/11/2018</a:t>
+              <a:t>10/11/2018</a:t>
             </a:fld>
             <a:endParaRPr lang="en-SG"/>
           </a:p>
@@ -2120,7 +2120,7 @@
           <a:p>
             <a:fld id="{9EA1E237-0560-428C-B221-4A3423CA1D4D}" type="datetimeFigureOut">
               <a:rPr lang="en-SG" smtClean="0"/>
-              <a:t>2/11/2018</a:t>
+              <a:t>10/11/2018</a:t>
             </a:fld>
             <a:endParaRPr lang="en-SG"/>
           </a:p>
@@ -2388,7 +2388,7 @@
           <a:p>
             <a:fld id="{9EA1E237-0560-428C-B221-4A3423CA1D4D}" type="datetimeFigureOut">
               <a:rPr lang="en-SG" smtClean="0"/>
-              <a:t>2/11/2018</a:t>
+              <a:t>10/11/2018</a:t>
             </a:fld>
             <a:endParaRPr lang="en-SG"/>
           </a:p>
@@ -2803,7 +2803,7 @@
           <a:p>
             <a:fld id="{9EA1E237-0560-428C-B221-4A3423CA1D4D}" type="datetimeFigureOut">
               <a:rPr lang="en-SG" smtClean="0"/>
-              <a:t>2/11/2018</a:t>
+              <a:t>10/11/2018</a:t>
             </a:fld>
             <a:endParaRPr lang="en-SG"/>
           </a:p>
@@ -2945,7 +2945,7 @@
           <a:p>
             <a:fld id="{9EA1E237-0560-428C-B221-4A3423CA1D4D}" type="datetimeFigureOut">
               <a:rPr lang="en-SG" smtClean="0"/>
-              <a:t>2/11/2018</a:t>
+              <a:t>10/11/2018</a:t>
             </a:fld>
             <a:endParaRPr lang="en-SG"/>
           </a:p>
@@ -3058,7 +3058,7 @@
           <a:p>
             <a:fld id="{9EA1E237-0560-428C-B221-4A3423CA1D4D}" type="datetimeFigureOut">
               <a:rPr lang="en-SG" smtClean="0"/>
-              <a:t>2/11/2018</a:t>
+              <a:t>10/11/2018</a:t>
             </a:fld>
             <a:endParaRPr lang="en-SG"/>
           </a:p>
@@ -3371,7 +3371,7 @@
           <a:p>
             <a:fld id="{9EA1E237-0560-428C-B221-4A3423CA1D4D}" type="datetimeFigureOut">
               <a:rPr lang="en-SG" smtClean="0"/>
-              <a:t>2/11/2018</a:t>
+              <a:t>10/11/2018</a:t>
             </a:fld>
             <a:endParaRPr lang="en-SG"/>
           </a:p>
@@ -3660,7 +3660,7 @@
           <a:p>
             <a:fld id="{9EA1E237-0560-428C-B221-4A3423CA1D4D}" type="datetimeFigureOut">
               <a:rPr lang="en-SG" smtClean="0"/>
-              <a:t>2/11/2018</a:t>
+              <a:t>10/11/2018</a:t>
             </a:fld>
             <a:endParaRPr lang="en-SG"/>
           </a:p>
@@ -3903,7 +3903,7 @@
           <a:p>
             <a:fld id="{9EA1E237-0560-428C-B221-4A3423CA1D4D}" type="datetimeFigureOut">
               <a:rPr lang="en-SG" smtClean="0"/>
-              <a:t>2/11/2018</a:t>
+              <a:t>10/11/2018</a:t>
             </a:fld>
             <a:endParaRPr lang="en-SG"/>
           </a:p>
@@ -4322,10 +4322,10 @@
       </p:grpSpPr>
       <p:pic>
         <p:nvPicPr>
-          <p:cNvPr id="3" name="Picture 2">
-            <a:extLst>
-              <a:ext uri="{FF2B5EF4-FFF2-40B4-BE49-F238E27FC236}">
-                <a16:creationId xmlns:a16="http://schemas.microsoft.com/office/drawing/2014/main" id="{BD280C0F-6DAE-4A36-97A8-CC802B0B9C52}"/>
+          <p:cNvPr id="2" name="Picture 1">
+            <a:extLst>
+              <a:ext uri="{FF2B5EF4-FFF2-40B4-BE49-F238E27FC236}">
+                <a16:creationId xmlns:a16="http://schemas.microsoft.com/office/drawing/2014/main" id="{1DC4DD84-EC73-4615-AA3B-F91C620BC756}"/>
               </a:ext>
             </a:extLst>
           </p:cNvPr>
@@ -4342,8 +4342,8 @@
         </p:blipFill>
         <p:spPr>
           <a:xfrm>
-            <a:off x="0" y="179282"/>
-            <a:ext cx="12192000" cy="6499435"/>
+            <a:off x="0" y="158750"/>
+            <a:ext cx="12192000" cy="6540500"/>
           </a:xfrm>
           <a:prstGeom prst="rect">
             <a:avLst/>
@@ -4364,8 +4364,8 @@
         </p:nvSpPr>
         <p:spPr>
           <a:xfrm>
-            <a:off x="0" y="695325"/>
-            <a:ext cx="3248025" cy="5705475"/>
+            <a:off x="1" y="695326"/>
+            <a:ext cx="2800350" cy="5705474"/>
           </a:xfrm>
           <a:prstGeom prst="rect">
             <a:avLst/>
@@ -4416,7 +4416,7 @@
         </p:nvSpPr>
         <p:spPr>
           <a:xfrm>
-            <a:off x="3419475" y="695326"/>
+            <a:off x="3122295" y="670667"/>
             <a:ext cx="3609975" cy="933450"/>
           </a:xfrm>
           <a:prstGeom prst="rect">
@@ -4468,7 +4468,7 @@
         </p:nvSpPr>
         <p:spPr>
           <a:xfrm>
-            <a:off x="3419475" y="1678095"/>
+            <a:off x="3122295" y="1628776"/>
             <a:ext cx="8572500" cy="2903430"/>
           </a:xfrm>
           <a:prstGeom prst="rect">
@@ -4577,7 +4577,7 @@
         </p:nvSpPr>
         <p:spPr>
           <a:xfrm>
-            <a:off x="3419475" y="455507"/>
+            <a:off x="6265545" y="596689"/>
             <a:ext cx="466725" cy="430320"/>
           </a:xfrm>
           <a:prstGeom prst="ellipse">
@@ -4634,7 +4634,7 @@
         </p:nvSpPr>
         <p:spPr>
           <a:xfrm>
-            <a:off x="11391900" y="1628776"/>
+            <a:off x="10994708" y="2440306"/>
             <a:ext cx="466725" cy="430320"/>
           </a:xfrm>
           <a:prstGeom prst="ellipse">
@@ -4709,10 +4709,10 @@
       </p:grpSpPr>
       <p:pic>
         <p:nvPicPr>
-          <p:cNvPr id="5" name="Picture 4">
-            <a:extLst>
-              <a:ext uri="{FF2B5EF4-FFF2-40B4-BE49-F238E27FC236}">
-                <a16:creationId xmlns:a16="http://schemas.microsoft.com/office/drawing/2014/main" id="{CB1924E4-30B7-4FD5-B6E2-33FD5ACD398D}"/>
+          <p:cNvPr id="3" name="Picture 2">
+            <a:extLst>
+              <a:ext uri="{FF2B5EF4-FFF2-40B4-BE49-F238E27FC236}">
+                <a16:creationId xmlns:a16="http://schemas.microsoft.com/office/drawing/2014/main" id="{C09BE24B-67EE-4753-BCD5-8BB6D47B0D70}"/>
               </a:ext>
             </a:extLst>
           </p:cNvPr>
@@ -4722,21 +4722,15 @@
           <p:nvPr/>
         </p:nvPicPr>
         <p:blipFill>
-          <a:blip r:embed="rId3">
-            <a:extLst>
-              <a:ext uri="{28A0092B-C50C-407E-A947-70E740481C1C}">
-                <a14:useLocalDpi xmlns:a14="http://schemas.microsoft.com/office/drawing/2010/main" val="0"/>
-              </a:ext>
-            </a:extLst>
-          </a:blip>
+          <a:blip r:embed="rId3"/>
           <a:stretch>
             <a:fillRect/>
           </a:stretch>
         </p:blipFill>
         <p:spPr>
           <a:xfrm>
-            <a:off x="4463966" y="561827"/>
-            <a:ext cx="3264068" cy="5734345"/>
+            <a:off x="4383956" y="85269"/>
+            <a:ext cx="3264068" cy="6763385"/>
           </a:xfrm>
           <a:prstGeom prst="rect">
             <a:avLst/>
@@ -4757,7 +4751,7 @@
         </p:nvSpPr>
         <p:spPr>
           <a:xfrm>
-            <a:off x="4463966" y="1118937"/>
+            <a:off x="4383956" y="650307"/>
             <a:ext cx="3264068" cy="1359568"/>
           </a:xfrm>
           <a:prstGeom prst="rect">
@@ -4827,10 +4821,10 @@
       </p:grpSpPr>
       <p:pic>
         <p:nvPicPr>
-          <p:cNvPr id="5" name="Picture 4">
-            <a:extLst>
-              <a:ext uri="{FF2B5EF4-FFF2-40B4-BE49-F238E27FC236}">
-                <a16:creationId xmlns:a16="http://schemas.microsoft.com/office/drawing/2014/main" id="{CB1924E4-30B7-4FD5-B6E2-33FD5ACD398D}"/>
+          <p:cNvPr id="9" name="Picture 8">
+            <a:extLst>
+              <a:ext uri="{FF2B5EF4-FFF2-40B4-BE49-F238E27FC236}">
+                <a16:creationId xmlns:a16="http://schemas.microsoft.com/office/drawing/2014/main" id="{3F009FDB-74DA-4568-966F-B5A5B824C5E3}"/>
               </a:ext>
             </a:extLst>
           </p:cNvPr>
@@ -4840,21 +4834,15 @@
           <p:nvPr/>
         </p:nvPicPr>
         <p:blipFill>
-          <a:blip r:embed="rId3">
-            <a:extLst>
-              <a:ext uri="{28A0092B-C50C-407E-A947-70E740481C1C}">
-                <a14:useLocalDpi xmlns:a14="http://schemas.microsoft.com/office/drawing/2010/main" val="0"/>
-              </a:ext>
-            </a:extLst>
-          </a:blip>
+          <a:blip r:embed="rId3"/>
           <a:stretch>
             <a:fillRect/>
           </a:stretch>
         </p:blipFill>
         <p:spPr>
           <a:xfrm>
-            <a:off x="4463966" y="561827"/>
-            <a:ext cx="3264068" cy="5734345"/>
+            <a:off x="4383956" y="85269"/>
+            <a:ext cx="3264068" cy="6763385"/>
           </a:xfrm>
           <a:prstGeom prst="rect">
             <a:avLst/>
@@ -4875,7 +4863,7 @@
         </p:nvSpPr>
         <p:spPr>
           <a:xfrm>
-            <a:off x="4629151" y="1228725"/>
+            <a:off x="4511042" y="725805"/>
             <a:ext cx="304800" cy="332509"/>
           </a:xfrm>
           <a:prstGeom prst="ellipse">
@@ -4927,7 +4915,7 @@
         </p:nvSpPr>
         <p:spPr>
           <a:xfrm>
-            <a:off x="4619626" y="2562225"/>
+            <a:off x="4562476" y="2139315"/>
             <a:ext cx="304800" cy="332509"/>
           </a:xfrm>
           <a:prstGeom prst="ellipse">
@@ -5265,10 +5253,10 @@
       </p:grpSpPr>
       <p:pic>
         <p:nvPicPr>
-          <p:cNvPr id="4" name="Picture 3">
-            <a:extLst>
-              <a:ext uri="{FF2B5EF4-FFF2-40B4-BE49-F238E27FC236}">
-                <a16:creationId xmlns:a16="http://schemas.microsoft.com/office/drawing/2014/main" id="{2002DC19-B44A-4A03-AE6D-E3FB33AE9930}"/>
+          <p:cNvPr id="2" name="Picture 1">
+            <a:extLst>
+              <a:ext uri="{FF2B5EF4-FFF2-40B4-BE49-F238E27FC236}">
+                <a16:creationId xmlns:a16="http://schemas.microsoft.com/office/drawing/2014/main" id="{F2634D89-135E-4718-BAA2-FCBEA7AEA14F}"/>
               </a:ext>
             </a:extLst>
           </p:cNvPr>
@@ -5285,16 +5273,12 @@
         </p:blipFill>
         <p:spPr>
           <a:xfrm>
-            <a:off x="845226" y="0"/>
-            <a:ext cx="10501548" cy="6858000"/>
+            <a:off x="705464" y="0"/>
+            <a:ext cx="10781071" cy="6858000"/>
           </a:xfrm>
           <a:prstGeom prst="rect">
             <a:avLst/>
           </a:prstGeom>
-          <a:noFill/>
-          <a:ln>
-            <a:noFill/>
-          </a:ln>
         </p:spPr>
       </p:pic>
       <p:sp>
@@ -5311,7 +5295,7 @@
         </p:nvSpPr>
         <p:spPr>
           <a:xfrm>
-            <a:off x="1123950" y="1257300"/>
+            <a:off x="1078230" y="1120140"/>
             <a:ext cx="581025" cy="1476375"/>
           </a:xfrm>
           <a:prstGeom prst="rect">
@@ -5345,7 +5329,7 @@
           <a:lstStyle/>
           <a:p>
             <a:pPr algn="ctr"/>
-            <a:endParaRPr lang="en-SG"/>
+            <a:endParaRPr lang="en-SG" dirty="0"/>
           </a:p>
         </p:txBody>
       </p:sp>
@@ -5381,10 +5365,10 @@
       </p:grpSpPr>
       <p:pic>
         <p:nvPicPr>
-          <p:cNvPr id="5" name="Picture 4">
-            <a:extLst>
-              <a:ext uri="{FF2B5EF4-FFF2-40B4-BE49-F238E27FC236}">
-                <a16:creationId xmlns:a16="http://schemas.microsoft.com/office/drawing/2014/main" id="{C54EDFE1-2800-4F26-ACA8-25CB6CBEFE87}"/>
+          <p:cNvPr id="4" name="Picture 3">
+            <a:extLst>
+              <a:ext uri="{FF2B5EF4-FFF2-40B4-BE49-F238E27FC236}">
+                <a16:creationId xmlns:a16="http://schemas.microsoft.com/office/drawing/2014/main" id="{91FC91A9-DD63-4809-96F3-A29EE10F6F00}"/>
               </a:ext>
             </a:extLst>
           </p:cNvPr>
@@ -5394,21 +5378,15 @@
           <p:nvPr/>
         </p:nvPicPr>
         <p:blipFill>
-          <a:blip r:embed="rId3">
-            <a:extLst>
-              <a:ext uri="{28A0092B-C50C-407E-A947-70E740481C1C}">
-                <a14:useLocalDpi xmlns:a14="http://schemas.microsoft.com/office/drawing/2010/main" val="0"/>
-              </a:ext>
-            </a:extLst>
-          </a:blip>
+          <a:blip r:embed="rId3"/>
           <a:stretch>
             <a:fillRect/>
           </a:stretch>
         </p:blipFill>
         <p:spPr>
           <a:xfrm>
-            <a:off x="1663472" y="530076"/>
-            <a:ext cx="8865056" cy="5797848"/>
+            <a:off x="705464" y="0"/>
+            <a:ext cx="10781071" cy="6858000"/>
           </a:xfrm>
           <a:prstGeom prst="rect">
             <a:avLst/>
@@ -5429,8 +5407,8 @@
         </p:nvSpPr>
         <p:spPr>
           <a:xfrm>
-            <a:off x="1914525" y="2438400"/>
-            <a:ext cx="8334375" cy="419100"/>
+            <a:off x="1068705" y="2038350"/>
+            <a:ext cx="10029825" cy="384810"/>
           </a:xfrm>
           <a:prstGeom prst="rect">
             <a:avLst/>
@@ -5499,10 +5477,10 @@
       </p:grpSpPr>
       <p:pic>
         <p:nvPicPr>
-          <p:cNvPr id="3" name="Picture 2">
-            <a:extLst>
-              <a:ext uri="{FF2B5EF4-FFF2-40B4-BE49-F238E27FC236}">
-                <a16:creationId xmlns:a16="http://schemas.microsoft.com/office/drawing/2014/main" id="{816969CD-5280-4D6D-8EA0-11EB192E3C9B}"/>
+          <p:cNvPr id="2" name="Picture 1">
+            <a:extLst>
+              <a:ext uri="{FF2B5EF4-FFF2-40B4-BE49-F238E27FC236}">
+                <a16:creationId xmlns:a16="http://schemas.microsoft.com/office/drawing/2014/main" id="{59F4BAB4-A0BD-415E-9EE9-BA24423CBCE3}"/>
               </a:ext>
             </a:extLst>
           </p:cNvPr>
@@ -5512,21 +5490,15 @@
           <p:nvPr/>
         </p:nvPicPr>
         <p:blipFill>
-          <a:blip r:embed="rId3">
-            <a:extLst>
-              <a:ext uri="{28A0092B-C50C-407E-A947-70E740481C1C}">
-                <a14:useLocalDpi xmlns:a14="http://schemas.microsoft.com/office/drawing/2010/main" val="0"/>
-              </a:ext>
-            </a:extLst>
-          </a:blip>
+          <a:blip r:embed="rId3"/>
           <a:stretch>
             <a:fillRect/>
           </a:stretch>
         </p:blipFill>
         <p:spPr>
           <a:xfrm>
-            <a:off x="1672997" y="533251"/>
-            <a:ext cx="8846005" cy="5791498"/>
+            <a:off x="705994" y="0"/>
+            <a:ext cx="10780011" cy="6858000"/>
           </a:xfrm>
           <a:prstGeom prst="rect">
             <a:avLst/>
@@ -5547,8 +5519,8 @@
         </p:nvSpPr>
         <p:spPr>
           <a:xfrm>
-            <a:off x="1914525" y="2438400"/>
-            <a:ext cx="8334375" cy="419100"/>
+            <a:off x="1102995" y="2015490"/>
+            <a:ext cx="9995535" cy="430530"/>
           </a:xfrm>
           <a:prstGeom prst="rect">
             <a:avLst/>

</xml_diff>